<commit_message>
WGM ppt preparation updated
</commit_message>
<xml_diff>
--- a/08_Project_management/WGM Reports/5th_WGM/Timeline.pptx
+++ b/08_Project_management/WGM Reports/5th_WGM/Timeline.pptx
@@ -257,7 +257,7 @@
           <a:p>
             <a:fld id="{DD47B1ED-05C6-43AD-85E9-3FF99C9F49B3}" type="datetimeFigureOut">
               <a:rPr lang="en-GB" smtClean="0"/>
-              <a:t>26/03/2018</a:t>
+              <a:t>27/03/2018</a:t>
             </a:fld>
             <a:endParaRPr lang="en-GB"/>
           </a:p>
@@ -427,7 +427,7 @@
           <a:p>
             <a:fld id="{DD47B1ED-05C6-43AD-85E9-3FF99C9F49B3}" type="datetimeFigureOut">
               <a:rPr lang="en-GB" smtClean="0"/>
-              <a:t>26/03/2018</a:t>
+              <a:t>27/03/2018</a:t>
             </a:fld>
             <a:endParaRPr lang="en-GB"/>
           </a:p>
@@ -607,7 +607,7 @@
           <a:p>
             <a:fld id="{DD47B1ED-05C6-43AD-85E9-3FF99C9F49B3}" type="datetimeFigureOut">
               <a:rPr lang="en-GB" smtClean="0"/>
-              <a:t>26/03/2018</a:t>
+              <a:t>27/03/2018</a:t>
             </a:fld>
             <a:endParaRPr lang="en-GB"/>
           </a:p>
@@ -777,7 +777,7 @@
           <a:p>
             <a:fld id="{DD47B1ED-05C6-43AD-85E9-3FF99C9F49B3}" type="datetimeFigureOut">
               <a:rPr lang="en-GB" smtClean="0"/>
-              <a:t>26/03/2018</a:t>
+              <a:t>27/03/2018</a:t>
             </a:fld>
             <a:endParaRPr lang="en-GB"/>
           </a:p>
@@ -1023,7 +1023,7 @@
           <a:p>
             <a:fld id="{DD47B1ED-05C6-43AD-85E9-3FF99C9F49B3}" type="datetimeFigureOut">
               <a:rPr lang="en-GB" smtClean="0"/>
-              <a:t>26/03/2018</a:t>
+              <a:t>27/03/2018</a:t>
             </a:fld>
             <a:endParaRPr lang="en-GB"/>
           </a:p>
@@ -1255,7 +1255,7 @@
           <a:p>
             <a:fld id="{DD47B1ED-05C6-43AD-85E9-3FF99C9F49B3}" type="datetimeFigureOut">
               <a:rPr lang="en-GB" smtClean="0"/>
-              <a:t>26/03/2018</a:t>
+              <a:t>27/03/2018</a:t>
             </a:fld>
             <a:endParaRPr lang="en-GB"/>
           </a:p>
@@ -1622,7 +1622,7 @@
           <a:p>
             <a:fld id="{DD47B1ED-05C6-43AD-85E9-3FF99C9F49B3}" type="datetimeFigureOut">
               <a:rPr lang="en-GB" smtClean="0"/>
-              <a:t>26/03/2018</a:t>
+              <a:t>27/03/2018</a:t>
             </a:fld>
             <a:endParaRPr lang="en-GB"/>
           </a:p>
@@ -1740,7 +1740,7 @@
           <a:p>
             <a:fld id="{DD47B1ED-05C6-43AD-85E9-3FF99C9F49B3}" type="datetimeFigureOut">
               <a:rPr lang="en-GB" smtClean="0"/>
-              <a:t>26/03/2018</a:t>
+              <a:t>27/03/2018</a:t>
             </a:fld>
             <a:endParaRPr lang="en-GB"/>
           </a:p>
@@ -1835,7 +1835,7 @@
           <a:p>
             <a:fld id="{DD47B1ED-05C6-43AD-85E9-3FF99C9F49B3}" type="datetimeFigureOut">
               <a:rPr lang="en-GB" smtClean="0"/>
-              <a:t>26/03/2018</a:t>
+              <a:t>27/03/2018</a:t>
             </a:fld>
             <a:endParaRPr lang="en-GB"/>
           </a:p>
@@ -2112,7 +2112,7 @@
           <a:p>
             <a:fld id="{DD47B1ED-05C6-43AD-85E9-3FF99C9F49B3}" type="datetimeFigureOut">
               <a:rPr lang="en-GB" smtClean="0"/>
-              <a:t>26/03/2018</a:t>
+              <a:t>27/03/2018</a:t>
             </a:fld>
             <a:endParaRPr lang="en-GB"/>
           </a:p>
@@ -2365,7 +2365,7 @@
           <a:p>
             <a:fld id="{DD47B1ED-05C6-43AD-85E9-3FF99C9F49B3}" type="datetimeFigureOut">
               <a:rPr lang="en-GB" smtClean="0"/>
-              <a:t>26/03/2018</a:t>
+              <a:t>27/03/2018</a:t>
             </a:fld>
             <a:endParaRPr lang="en-GB"/>
           </a:p>
@@ -2578,7 +2578,7 @@
           <a:p>
             <a:fld id="{DD47B1ED-05C6-43AD-85E9-3FF99C9F49B3}" type="datetimeFigureOut">
               <a:rPr lang="en-GB" smtClean="0"/>
-              <a:t>26/03/2018</a:t>
+              <a:t>27/03/2018</a:t>
             </a:fld>
             <a:endParaRPr lang="en-GB"/>
           </a:p>
@@ -4610,52 +4610,6 @@
       </p:sp>
       <p:sp>
         <p:nvSpPr>
-          <p:cNvPr id="26" name="CuadroTexto 25"/>
-          <p:cNvSpPr txBox="1"/>
-          <p:nvPr/>
-        </p:nvSpPr>
-        <p:spPr>
-          <a:xfrm>
-            <a:off x="1037229" y="1698856"/>
-            <a:ext cx="4398531" cy="646331"/>
-          </a:xfrm>
-          <a:prstGeom prst="rect">
-            <a:avLst/>
-          </a:prstGeom>
-          <a:noFill/>
-        </p:spPr>
-        <p:txBody>
-          <a:bodyPr wrap="square" rtlCol="0">
-            <a:spAutoFit/>
-          </a:bodyPr>
-          <a:lstStyle/>
-          <a:p>
-            <a:pPr algn="r"/>
-            <a:r>
-              <a:rPr lang="en-GB" sz="1200" dirty="0" smtClean="0"/>
-              <a:t>Working Group Meeting (23</a:t>
-            </a:r>
-            <a:r>
-              <a:rPr lang="en-GB" sz="1200" baseline="30000" dirty="0" smtClean="0"/>
-              <a:t>rd</a:t>
-            </a:r>
-            <a:r>
-              <a:rPr lang="en-GB" sz="1200" dirty="0" smtClean="0"/>
-              <a:t> February)</a:t>
-            </a:r>
-          </a:p>
-          <a:p>
-            <a:pPr algn="r"/>
-            <a:r>
-              <a:rPr lang="en-GB" sz="1200" i="1" dirty="0" smtClean="0"/>
-              <a:t>Subject: Presentation of the new mission, considerations on the scope and methodology.</a:t>
-            </a:r>
-            <a:endParaRPr lang="en-GB" sz="1200" i="1" dirty="0"/>
-          </a:p>
-        </p:txBody>
-      </p:sp>
-      <p:sp>
-        <p:nvSpPr>
           <p:cNvPr id="29" name="CuadroTexto 28"/>
           <p:cNvSpPr txBox="1"/>
           <p:nvPr/>
@@ -4773,109 +4727,6 @@
                 </a:solidFill>
               </a:rPr>
               <a:t>Subject: Revision of the ontology, conceptual model and design considerations.</a:t>
-            </a:r>
-            <a:endParaRPr lang="en-GB" sz="1200" i="1" dirty="0">
-              <a:solidFill>
-                <a:schemeClr val="tx1">
-                  <a:lumMod val="65000"/>
-                  <a:lumOff val="35000"/>
-                </a:schemeClr>
-              </a:solidFill>
-            </a:endParaRPr>
-          </a:p>
-        </p:txBody>
-      </p:sp>
-      <p:sp>
-        <p:nvSpPr>
-          <p:cNvPr id="33" name="CuadroTexto 32"/>
-          <p:cNvSpPr txBox="1"/>
-          <p:nvPr/>
-        </p:nvSpPr>
-        <p:spPr>
-          <a:xfrm>
-            <a:off x="1471215" y="4934794"/>
-            <a:ext cx="3964547" cy="461665"/>
-          </a:xfrm>
-          <a:prstGeom prst="rect">
-            <a:avLst/>
-          </a:prstGeom>
-          <a:noFill/>
-        </p:spPr>
-        <p:txBody>
-          <a:bodyPr wrap="none" rtlCol="0">
-            <a:spAutoFit/>
-          </a:bodyPr>
-          <a:lstStyle/>
-          <a:p>
-            <a:pPr algn="r"/>
-            <a:r>
-              <a:rPr lang="en-GB" sz="1200" dirty="0" smtClean="0">
-                <a:solidFill>
-                  <a:schemeClr val="tx1">
-                    <a:lumMod val="65000"/>
-                    <a:lumOff val="35000"/>
-                  </a:schemeClr>
-                </a:solidFill>
-              </a:rPr>
-              <a:t>Working Group Meeting (1</a:t>
-            </a:r>
-            <a:r>
-              <a:rPr lang="en-GB" sz="1200" baseline="30000" dirty="0" smtClean="0">
-                <a:solidFill>
-                  <a:schemeClr val="tx1">
-                    <a:lumMod val="65000"/>
-                    <a:lumOff val="35000"/>
-                  </a:schemeClr>
-                </a:solidFill>
-              </a:rPr>
-              <a:t>st</a:t>
-            </a:r>
-            <a:r>
-              <a:rPr lang="en-GB" sz="1200" dirty="0" smtClean="0">
-                <a:solidFill>
-                  <a:schemeClr val="tx1">
-                    <a:lumMod val="65000"/>
-                    <a:lumOff val="35000"/>
-                  </a:schemeClr>
-                </a:solidFill>
-              </a:rPr>
-              <a:t> June)</a:t>
-            </a:r>
-          </a:p>
-          <a:p>
-            <a:pPr algn="r"/>
-            <a:r>
-              <a:rPr lang="en-GB" sz="1200" i="1" dirty="0" smtClean="0">
-                <a:solidFill>
-                  <a:schemeClr val="tx1">
-                    <a:lumMod val="65000"/>
-                    <a:lumOff val="35000"/>
-                  </a:schemeClr>
-                </a:solidFill>
-              </a:rPr>
-              <a:t>Subject: Results of the </a:t>
-            </a:r>
-            <a:r>
-              <a:rPr lang="en-GB" sz="1200" i="1" dirty="0" err="1" smtClean="0">
-                <a:solidFill>
-                  <a:schemeClr val="tx1">
-                    <a:lumMod val="65000"/>
-                    <a:lumOff val="35000"/>
-                  </a:schemeClr>
-                </a:solidFill>
-              </a:rPr>
-              <a:t>PoC</a:t>
-            </a:r>
-            <a:r>
-              <a:rPr lang="en-GB" sz="1200" i="1" dirty="0" smtClean="0">
-                <a:solidFill>
-                  <a:schemeClr val="tx1">
-                    <a:lumMod val="65000"/>
-                    <a:lumOff val="35000"/>
-                  </a:schemeClr>
-                </a:solidFill>
-              </a:rPr>
-              <a:t> and progress on the final version.</a:t>
             </a:r>
             <a:endParaRPr lang="en-GB" sz="1200" i="1" dirty="0">
               <a:solidFill>
@@ -5305,14 +5156,14 @@
       </p:pic>
       <p:sp>
         <p:nvSpPr>
-          <p:cNvPr id="35" name="CuadroTexto 34"/>
+          <p:cNvPr id="37" name="CuadroTexto 34"/>
           <p:cNvSpPr txBox="1"/>
           <p:nvPr/>
         </p:nvSpPr>
         <p:spPr>
           <a:xfrm>
-            <a:off x="5701704" y="1901177"/>
-            <a:ext cx="4982338" cy="646331"/>
+            <a:off x="5701704" y="3179239"/>
+            <a:ext cx="5632042" cy="646331"/>
           </a:xfrm>
           <a:prstGeom prst="rect">
             <a:avLst/>
@@ -5327,7 +5178,7 @@
           <a:p>
             <a:r>
               <a:rPr lang="en-GB" sz="1200" dirty="0" smtClean="0"/>
-              <a:t>9</a:t>
+              <a:t>19</a:t>
             </a:r>
             <a:r>
               <a:rPr lang="en-GB" sz="1200" baseline="30000" dirty="0" smtClean="0"/>
@@ -5335,23 +5186,39 @@
             </a:r>
             <a:r>
               <a:rPr lang="en-GB" sz="1200" dirty="0" smtClean="0"/>
-              <a:t> March</a:t>
+              <a:t> April</a:t>
             </a:r>
             <a:br>
               <a:rPr lang="en-GB" sz="1200" dirty="0" smtClean="0"/>
             </a:br>
             <a:r>
               <a:rPr lang="en-GB" sz="1200" dirty="0" smtClean="0"/>
-              <a:t>	1. </a:t>
+              <a:t>	</a:t>
             </a:r>
             <a:r>
               <a:rPr lang="en-GB" sz="1200" i="1" dirty="0" smtClean="0"/>
-              <a:t>Glossary Acceptance by the Working Group.</a:t>
-            </a:r>
-          </a:p>
-          <a:p>
-            <a:r>
-              <a:rPr lang="es-ES" sz="1200" i="1" dirty="0"/>
+              <a:t>1</a:t>
+            </a:r>
+            <a:r>
+              <a:rPr lang="en-GB" sz="1200" i="1" dirty="0"/>
+              <a:t>. </a:t>
+            </a:r>
+            <a:r>
+              <a:rPr lang="en-GB" sz="1200" i="1" dirty="0" smtClean="0"/>
+              <a:t>Second draft </a:t>
+            </a:r>
+            <a:r>
+              <a:rPr lang="en-GB" sz="1200" i="1" dirty="0"/>
+              <a:t>Conceptual Data Model available for revision by WG</a:t>
+            </a:r>
+            <a:r>
+              <a:rPr lang="en-GB" sz="1200" dirty="0" smtClean="0"/>
+              <a:t>.</a:t>
+            </a:r>
+          </a:p>
+          <a:p>
+            <a:r>
+              <a:rPr lang="es-ES" sz="1200" dirty="0"/>
               <a:t>	</a:t>
             </a:r>
             <a:r>
@@ -5360,7 +5227,23 @@
             </a:r>
             <a:r>
               <a:rPr lang="es-ES" sz="1200" i="1" dirty="0" err="1" smtClean="0"/>
-              <a:t>Sample</a:t>
+              <a:t>First</a:t>
+            </a:r>
+            <a:r>
+              <a:rPr lang="es-ES" sz="1200" i="1" dirty="0" smtClean="0"/>
+              <a:t> versión of </a:t>
+            </a:r>
+            <a:r>
+              <a:rPr lang="es-ES" sz="1200" i="1" dirty="0" err="1" smtClean="0"/>
+              <a:t>PoC</a:t>
+            </a:r>
+            <a:r>
+              <a:rPr lang="es-ES" sz="1200" i="1" dirty="0" smtClean="0"/>
+              <a:t>  </a:t>
+            </a:r>
+            <a:r>
+              <a:rPr lang="es-ES" sz="1200" i="1" dirty="0" err="1" smtClean="0"/>
+              <a:t>available</a:t>
             </a:r>
             <a:r>
               <a:rPr lang="es-ES" sz="1200" i="1" dirty="0" smtClean="0"/>
@@ -5368,39 +5251,15 @@
             </a:r>
             <a:r>
               <a:rPr lang="es-ES" sz="1200" i="1" dirty="0" err="1" smtClean="0"/>
-              <a:t>Competency</a:t>
+              <a:t>for</a:t>
             </a:r>
             <a:r>
               <a:rPr lang="es-ES" sz="1200" i="1" dirty="0" smtClean="0"/>
-              <a:t> </a:t>
+              <a:t> revisión </a:t>
             </a:r>
             <a:r>
               <a:rPr lang="es-ES" sz="1200" i="1" dirty="0" err="1" smtClean="0"/>
-              <a:t>Questions</a:t>
-            </a:r>
-            <a:r>
-              <a:rPr lang="es-ES" sz="1200" i="1" dirty="0" smtClean="0"/>
-              <a:t> </a:t>
-            </a:r>
-            <a:r>
-              <a:rPr lang="es-ES" sz="1200" i="1" dirty="0" err="1" smtClean="0"/>
-              <a:t>available</a:t>
-            </a:r>
-            <a:r>
-              <a:rPr lang="es-ES" sz="1200" i="1" dirty="0" smtClean="0"/>
-              <a:t> </a:t>
-            </a:r>
-            <a:r>
-              <a:rPr lang="es-ES" sz="1200" i="1" dirty="0" err="1" smtClean="0"/>
-              <a:t>for</a:t>
-            </a:r>
-            <a:r>
-              <a:rPr lang="es-ES" sz="1200" i="1" dirty="0" smtClean="0"/>
-              <a:t> </a:t>
-            </a:r>
-            <a:r>
-              <a:rPr lang="es-ES" sz="1200" i="1" dirty="0" err="1" smtClean="0"/>
-              <a:t>the</a:t>
+              <a:t>by</a:t>
             </a:r>
             <a:r>
               <a:rPr lang="es-ES" sz="1200" i="1" dirty="0" smtClean="0"/>
@@ -5412,13 +5271,66 @@
       </p:sp>
       <p:sp>
         <p:nvSpPr>
-          <p:cNvPr id="36" name="Elipse 35"/>
+          <p:cNvPr id="38" name="CuadroTexto 34"/>
+          <p:cNvSpPr txBox="1"/>
+          <p:nvPr/>
+        </p:nvSpPr>
+        <p:spPr>
+          <a:xfrm>
+            <a:off x="5701704" y="3758763"/>
+            <a:ext cx="4398531" cy="461665"/>
+          </a:xfrm>
+          <a:prstGeom prst="rect">
+            <a:avLst/>
+          </a:prstGeom>
+          <a:noFill/>
+        </p:spPr>
+        <p:txBody>
+          <a:bodyPr wrap="square" rtlCol="0">
+            <a:spAutoFit/>
+          </a:bodyPr>
+          <a:lstStyle/>
+          <a:p>
+            <a:r>
+              <a:rPr lang="en-GB" sz="1200" dirty="0" smtClean="0"/>
+              <a:t>26</a:t>
+            </a:r>
+            <a:r>
+              <a:rPr lang="en-GB" sz="1200" baseline="30000" dirty="0" smtClean="0"/>
+              <a:t>th</a:t>
+            </a:r>
+            <a:r>
+              <a:rPr lang="en-GB" sz="1200" dirty="0" smtClean="0"/>
+              <a:t> April</a:t>
+            </a:r>
+            <a:br>
+              <a:rPr lang="en-GB" sz="1200" dirty="0" smtClean="0"/>
+            </a:br>
+            <a:r>
+              <a:rPr lang="en-GB" sz="1200" dirty="0" smtClean="0"/>
+              <a:t>	</a:t>
+            </a:r>
+            <a:r>
+              <a:rPr lang="en-GB" sz="1200" i="1" dirty="0" err="1" smtClean="0"/>
+              <a:t>PoC</a:t>
+            </a:r>
+            <a:r>
+              <a:rPr lang="en-GB" sz="1200" i="1" dirty="0" smtClean="0"/>
+              <a:t> final report available for comments by WG. </a:t>
+            </a:r>
+            <a:endParaRPr lang="en-GB" sz="1200" i="1" dirty="0"/>
+          </a:p>
+        </p:txBody>
+      </p:sp>
+      <p:sp>
+        <p:nvSpPr>
+          <p:cNvPr id="42" name="Elipse 35"/>
           <p:cNvSpPr/>
           <p:nvPr/>
         </p:nvSpPr>
         <p:spPr>
           <a:xfrm rot="5400000">
-            <a:off x="5498096" y="2013755"/>
+            <a:off x="5498096" y="3309152"/>
             <a:ext cx="72000" cy="72000"/>
           </a:xfrm>
           <a:prstGeom prst="ellipse">
@@ -5461,466 +5373,6 @@
       </p:sp>
       <p:sp>
         <p:nvSpPr>
-          <p:cNvPr id="19" name="CuadroTexto 34"/>
-          <p:cNvSpPr txBox="1"/>
-          <p:nvPr/>
-        </p:nvSpPr>
-        <p:spPr>
-          <a:xfrm>
-            <a:off x="5701704" y="2581873"/>
-            <a:ext cx="6490296" cy="461665"/>
-          </a:xfrm>
-          <a:prstGeom prst="rect">
-            <a:avLst/>
-          </a:prstGeom>
-          <a:noFill/>
-        </p:spPr>
-        <p:txBody>
-          <a:bodyPr wrap="square" rtlCol="0">
-            <a:spAutoFit/>
-          </a:bodyPr>
-          <a:lstStyle/>
-          <a:p>
-            <a:r>
-              <a:rPr lang="en-GB" sz="1200" dirty="0" smtClean="0"/>
-              <a:t>23</a:t>
-            </a:r>
-            <a:r>
-              <a:rPr lang="en-GB" sz="1200" baseline="30000" dirty="0" smtClean="0"/>
-              <a:t>rd</a:t>
-            </a:r>
-            <a:r>
-              <a:rPr lang="en-GB" sz="1200" dirty="0" smtClean="0"/>
-              <a:t> March	</a:t>
-            </a:r>
-            <a:r>
-              <a:rPr lang="en-GB" sz="1200" i="1" dirty="0"/>
-              <a:t>First draft Conceptual Data Model </a:t>
-            </a:r>
-            <a:r>
-              <a:rPr lang="en-GB" sz="1200" i="1" dirty="0" smtClean="0"/>
-              <a:t>foreseen for </a:t>
-            </a:r>
-            <a:r>
-              <a:rPr lang="en-GB" sz="1200" i="1" dirty="0"/>
-              <a:t>revision by </a:t>
-            </a:r>
-            <a:r>
-              <a:rPr lang="en-GB" sz="1200" i="1" dirty="0" smtClean="0"/>
-              <a:t>WG (postponed to the 26</a:t>
-            </a:r>
-            <a:r>
-              <a:rPr lang="en-GB" sz="1200" i="1" baseline="30000" dirty="0" smtClean="0"/>
-              <a:t>th</a:t>
-            </a:r>
-            <a:r>
-              <a:rPr lang="en-GB" sz="1200" i="1" dirty="0" smtClean="0"/>
-              <a:t> ) </a:t>
-            </a:r>
-            <a:r>
-              <a:rPr lang="en-GB" sz="1200" dirty="0" smtClean="0"/>
-              <a:t>.</a:t>
-            </a:r>
-            <a:endParaRPr lang="en-GB" sz="1200" dirty="0"/>
-          </a:p>
-          <a:p>
-            <a:r>
-              <a:rPr lang="en-GB" sz="1200" dirty="0" smtClean="0"/>
-              <a:t>26</a:t>
-            </a:r>
-            <a:r>
-              <a:rPr lang="en-GB" sz="1200" baseline="30000" dirty="0" smtClean="0"/>
-              <a:t>rd</a:t>
-            </a:r>
-            <a:r>
-              <a:rPr lang="en-GB" sz="1200" dirty="0" smtClean="0"/>
-              <a:t> </a:t>
-            </a:r>
-            <a:r>
-              <a:rPr lang="en-GB" sz="1200" dirty="0"/>
-              <a:t>March </a:t>
-            </a:r>
-            <a:r>
-              <a:rPr lang="en-GB" sz="1200" dirty="0" smtClean="0"/>
-              <a:t>	</a:t>
-            </a:r>
-            <a:r>
-              <a:rPr lang="en-GB" sz="1200" i="1" dirty="0" smtClean="0"/>
-              <a:t>First draft Conceptual Data Model available for revision by WG</a:t>
-            </a:r>
-            <a:r>
-              <a:rPr lang="en-GB" sz="1200" dirty="0" smtClean="0"/>
-              <a:t>.</a:t>
-            </a:r>
-          </a:p>
-        </p:txBody>
-      </p:sp>
-      <p:sp>
-        <p:nvSpPr>
-          <p:cNvPr id="37" name="CuadroTexto 34"/>
-          <p:cNvSpPr txBox="1"/>
-          <p:nvPr/>
-        </p:nvSpPr>
-        <p:spPr>
-          <a:xfrm>
-            <a:off x="5701704" y="3179239"/>
-            <a:ext cx="5632042" cy="646331"/>
-          </a:xfrm>
-          <a:prstGeom prst="rect">
-            <a:avLst/>
-          </a:prstGeom>
-          <a:noFill/>
-        </p:spPr>
-        <p:txBody>
-          <a:bodyPr wrap="square" rtlCol="0">
-            <a:spAutoFit/>
-          </a:bodyPr>
-          <a:lstStyle/>
-          <a:p>
-            <a:r>
-              <a:rPr lang="en-GB" sz="1200" dirty="0" smtClean="0"/>
-              <a:t>19</a:t>
-            </a:r>
-            <a:r>
-              <a:rPr lang="en-GB" sz="1200" baseline="30000" dirty="0" smtClean="0"/>
-              <a:t>th</a:t>
-            </a:r>
-            <a:r>
-              <a:rPr lang="en-GB" sz="1200" dirty="0" smtClean="0"/>
-              <a:t> April</a:t>
-            </a:r>
-            <a:br>
-              <a:rPr lang="en-GB" sz="1200" dirty="0" smtClean="0"/>
-            </a:br>
-            <a:r>
-              <a:rPr lang="en-GB" sz="1200" dirty="0" smtClean="0"/>
-              <a:t>	</a:t>
-            </a:r>
-            <a:r>
-              <a:rPr lang="en-GB" sz="1200" i="1" dirty="0" smtClean="0"/>
-              <a:t>1</a:t>
-            </a:r>
-            <a:r>
-              <a:rPr lang="en-GB" sz="1200" i="1" dirty="0"/>
-              <a:t>. </a:t>
-            </a:r>
-            <a:r>
-              <a:rPr lang="en-GB" sz="1200" i="1" dirty="0" smtClean="0"/>
-              <a:t>Second draft </a:t>
-            </a:r>
-            <a:r>
-              <a:rPr lang="en-GB" sz="1200" i="1" dirty="0"/>
-              <a:t>Conceptual Data Model available for revision by WG</a:t>
-            </a:r>
-            <a:r>
-              <a:rPr lang="en-GB" sz="1200" dirty="0" smtClean="0"/>
-              <a:t>.</a:t>
-            </a:r>
-          </a:p>
-          <a:p>
-            <a:r>
-              <a:rPr lang="es-ES" sz="1200" dirty="0"/>
-              <a:t>	</a:t>
-            </a:r>
-            <a:r>
-              <a:rPr lang="es-ES" sz="1200" i="1" dirty="0" smtClean="0"/>
-              <a:t>2. </a:t>
-            </a:r>
-            <a:r>
-              <a:rPr lang="es-ES" sz="1200" i="1" dirty="0" err="1" smtClean="0"/>
-              <a:t>First</a:t>
-            </a:r>
-            <a:r>
-              <a:rPr lang="es-ES" sz="1200" i="1" dirty="0" smtClean="0"/>
-              <a:t> versión of </a:t>
-            </a:r>
-            <a:r>
-              <a:rPr lang="es-ES" sz="1200" i="1" dirty="0" err="1" smtClean="0"/>
-              <a:t>PoC</a:t>
-            </a:r>
-            <a:r>
-              <a:rPr lang="es-ES" sz="1200" i="1" dirty="0" smtClean="0"/>
-              <a:t>  </a:t>
-            </a:r>
-            <a:r>
-              <a:rPr lang="es-ES" sz="1200" i="1" dirty="0" err="1" smtClean="0"/>
-              <a:t>available</a:t>
-            </a:r>
-            <a:r>
-              <a:rPr lang="es-ES" sz="1200" i="1" dirty="0" smtClean="0"/>
-              <a:t> </a:t>
-            </a:r>
-            <a:r>
-              <a:rPr lang="es-ES" sz="1200" i="1" dirty="0" err="1" smtClean="0"/>
-              <a:t>for</a:t>
-            </a:r>
-            <a:r>
-              <a:rPr lang="es-ES" sz="1200" i="1" dirty="0" smtClean="0"/>
-              <a:t> revisión </a:t>
-            </a:r>
-            <a:r>
-              <a:rPr lang="es-ES" sz="1200" i="1" dirty="0" err="1" smtClean="0"/>
-              <a:t>by</a:t>
-            </a:r>
-            <a:r>
-              <a:rPr lang="es-ES" sz="1200" i="1" dirty="0" smtClean="0"/>
-              <a:t> WG.</a:t>
-            </a:r>
-            <a:endParaRPr lang="en-GB" sz="1200" i="1" dirty="0"/>
-          </a:p>
-        </p:txBody>
-      </p:sp>
-      <p:sp>
-        <p:nvSpPr>
-          <p:cNvPr id="38" name="CuadroTexto 34"/>
-          <p:cNvSpPr txBox="1"/>
-          <p:nvPr/>
-        </p:nvSpPr>
-        <p:spPr>
-          <a:xfrm>
-            <a:off x="5701704" y="3758763"/>
-            <a:ext cx="4398531" cy="461665"/>
-          </a:xfrm>
-          <a:prstGeom prst="rect">
-            <a:avLst/>
-          </a:prstGeom>
-          <a:noFill/>
-        </p:spPr>
-        <p:txBody>
-          <a:bodyPr wrap="square" rtlCol="0">
-            <a:spAutoFit/>
-          </a:bodyPr>
-          <a:lstStyle/>
-          <a:p>
-            <a:r>
-              <a:rPr lang="en-GB" sz="1200" dirty="0" smtClean="0"/>
-              <a:t>26</a:t>
-            </a:r>
-            <a:r>
-              <a:rPr lang="en-GB" sz="1200" baseline="30000" dirty="0" smtClean="0"/>
-              <a:t>th</a:t>
-            </a:r>
-            <a:r>
-              <a:rPr lang="en-GB" sz="1200" dirty="0" smtClean="0"/>
-              <a:t> April</a:t>
-            </a:r>
-            <a:br>
-              <a:rPr lang="en-GB" sz="1200" dirty="0" smtClean="0"/>
-            </a:br>
-            <a:r>
-              <a:rPr lang="en-GB" sz="1200" dirty="0" smtClean="0"/>
-              <a:t>	</a:t>
-            </a:r>
-            <a:r>
-              <a:rPr lang="en-GB" sz="1200" i="1" dirty="0" err="1" smtClean="0"/>
-              <a:t>PoC</a:t>
-            </a:r>
-            <a:r>
-              <a:rPr lang="en-GB" sz="1200" i="1" dirty="0" smtClean="0"/>
-              <a:t> </a:t>
-            </a:r>
-            <a:r>
-              <a:rPr lang="en-GB" sz="1200" i="1" dirty="0" smtClean="0"/>
-              <a:t>final report available for comments by WG. </a:t>
-            </a:r>
-            <a:endParaRPr lang="en-GB" sz="1200" i="1" dirty="0"/>
-          </a:p>
-        </p:txBody>
-      </p:sp>
-      <p:sp>
-        <p:nvSpPr>
-          <p:cNvPr id="39" name="CuadroTexto 34"/>
-          <p:cNvSpPr txBox="1"/>
-          <p:nvPr/>
-        </p:nvSpPr>
-        <p:spPr>
-          <a:xfrm>
-            <a:off x="5701704" y="5535674"/>
-            <a:ext cx="4398531" cy="461665"/>
-          </a:xfrm>
-          <a:prstGeom prst="rect">
-            <a:avLst/>
-          </a:prstGeom>
-          <a:noFill/>
-        </p:spPr>
-        <p:txBody>
-          <a:bodyPr wrap="square" rtlCol="0">
-            <a:spAutoFit/>
-          </a:bodyPr>
-          <a:lstStyle/>
-          <a:p>
-            <a:r>
-              <a:rPr lang="en-GB" sz="1200" dirty="0" smtClean="0"/>
-              <a:t>18</a:t>
-            </a:r>
-            <a:r>
-              <a:rPr lang="en-GB" sz="1200" baseline="30000" dirty="0" smtClean="0"/>
-              <a:t>th</a:t>
-            </a:r>
-            <a:r>
-              <a:rPr lang="en-GB" sz="1200" dirty="0" smtClean="0"/>
-              <a:t> June</a:t>
-            </a:r>
-            <a:br>
-              <a:rPr lang="en-GB" sz="1200" dirty="0" smtClean="0"/>
-            </a:br>
-            <a:r>
-              <a:rPr lang="en-GB" sz="1200" i="1" dirty="0" smtClean="0"/>
-              <a:t>Release v2.0.0 available for review by WG</a:t>
-            </a:r>
-            <a:endParaRPr lang="en-GB" sz="1200" i="1" dirty="0"/>
-          </a:p>
-        </p:txBody>
-      </p:sp>
-      <p:sp>
-        <p:nvSpPr>
-          <p:cNvPr id="40" name="Elipse 35"/>
-          <p:cNvSpPr/>
-          <p:nvPr/>
-        </p:nvSpPr>
-        <p:spPr>
-          <a:xfrm rot="5400000">
-            <a:off x="5498096" y="2695545"/>
-            <a:ext cx="72000" cy="72000"/>
-          </a:xfrm>
-          <a:prstGeom prst="ellipse">
-            <a:avLst/>
-          </a:prstGeom>
-          <a:solidFill>
-            <a:schemeClr val="accent1">
-              <a:lumMod val="60000"/>
-              <a:lumOff val="40000"/>
-            </a:schemeClr>
-          </a:solidFill>
-          <a:ln>
-            <a:noFill/>
-          </a:ln>
-        </p:spPr>
-        <p:style>
-          <a:lnRef idx="2">
-            <a:schemeClr val="dk1">
-              <a:shade val="50000"/>
-            </a:schemeClr>
-          </a:lnRef>
-          <a:fillRef idx="1">
-            <a:schemeClr val="dk1"/>
-          </a:fillRef>
-          <a:effectRef idx="0">
-            <a:schemeClr val="dk1"/>
-          </a:effectRef>
-          <a:fontRef idx="minor">
-            <a:schemeClr val="lt1"/>
-          </a:fontRef>
-        </p:style>
-        <p:txBody>
-          <a:bodyPr rtlCol="0" anchor="ctr"/>
-          <a:lstStyle/>
-          <a:p>
-            <a:pPr algn="ctr"/>
-            <a:endParaRPr lang="en-GB"/>
-          </a:p>
-        </p:txBody>
-      </p:sp>
-      <p:sp>
-        <p:nvSpPr>
-          <p:cNvPr id="41" name="Elipse 35"/>
-          <p:cNvSpPr/>
-          <p:nvPr/>
-        </p:nvSpPr>
-        <p:spPr>
-          <a:xfrm rot="5400000">
-            <a:off x="5498096" y="2803824"/>
-            <a:ext cx="72000" cy="72000"/>
-          </a:xfrm>
-          <a:prstGeom prst="ellipse">
-            <a:avLst/>
-          </a:prstGeom>
-          <a:solidFill>
-            <a:schemeClr val="accent1">
-              <a:lumMod val="60000"/>
-              <a:lumOff val="40000"/>
-            </a:schemeClr>
-          </a:solidFill>
-          <a:ln>
-            <a:noFill/>
-          </a:ln>
-        </p:spPr>
-        <p:style>
-          <a:lnRef idx="2">
-            <a:schemeClr val="dk1">
-              <a:shade val="50000"/>
-            </a:schemeClr>
-          </a:lnRef>
-          <a:fillRef idx="1">
-            <a:schemeClr val="dk1"/>
-          </a:fillRef>
-          <a:effectRef idx="0">
-            <a:schemeClr val="dk1"/>
-          </a:effectRef>
-          <a:fontRef idx="minor">
-            <a:schemeClr val="lt1"/>
-          </a:fontRef>
-        </p:style>
-        <p:txBody>
-          <a:bodyPr rtlCol="0" anchor="ctr"/>
-          <a:lstStyle/>
-          <a:p>
-            <a:pPr algn="ctr"/>
-            <a:endParaRPr lang="en-GB"/>
-          </a:p>
-        </p:txBody>
-      </p:sp>
-      <p:sp>
-        <p:nvSpPr>
-          <p:cNvPr id="42" name="Elipse 35"/>
-          <p:cNvSpPr/>
-          <p:nvPr/>
-        </p:nvSpPr>
-        <p:spPr>
-          <a:xfrm rot="5400000">
-            <a:off x="5498096" y="3309152"/>
-            <a:ext cx="72000" cy="72000"/>
-          </a:xfrm>
-          <a:prstGeom prst="ellipse">
-            <a:avLst/>
-          </a:prstGeom>
-          <a:solidFill>
-            <a:schemeClr val="accent1">
-              <a:lumMod val="60000"/>
-              <a:lumOff val="40000"/>
-            </a:schemeClr>
-          </a:solidFill>
-          <a:ln>
-            <a:noFill/>
-          </a:ln>
-        </p:spPr>
-        <p:style>
-          <a:lnRef idx="2">
-            <a:schemeClr val="dk1">
-              <a:shade val="50000"/>
-            </a:schemeClr>
-          </a:lnRef>
-          <a:fillRef idx="1">
-            <a:schemeClr val="dk1"/>
-          </a:fillRef>
-          <a:effectRef idx="0">
-            <a:schemeClr val="dk1"/>
-          </a:effectRef>
-          <a:fontRef idx="minor">
-            <a:schemeClr val="lt1"/>
-          </a:fontRef>
-        </p:style>
-        <p:txBody>
-          <a:bodyPr rtlCol="0" anchor="ctr"/>
-          <a:lstStyle/>
-          <a:p>
-            <a:pPr algn="ctr"/>
-            <a:endParaRPr lang="en-GB"/>
-          </a:p>
-        </p:txBody>
-      </p:sp>
-      <p:sp>
-        <p:nvSpPr>
           <p:cNvPr id="43" name="Elipse 35"/>
           <p:cNvSpPr/>
           <p:nvPr/>
@@ -5928,55 +5380,6 @@
         <p:spPr>
           <a:xfrm rot="5400000">
             <a:off x="5498096" y="3862610"/>
-            <a:ext cx="72000" cy="72000"/>
-          </a:xfrm>
-          <a:prstGeom prst="ellipse">
-            <a:avLst/>
-          </a:prstGeom>
-          <a:solidFill>
-            <a:schemeClr val="accent1">
-              <a:lumMod val="60000"/>
-              <a:lumOff val="40000"/>
-            </a:schemeClr>
-          </a:solidFill>
-          <a:ln>
-            <a:noFill/>
-          </a:ln>
-        </p:spPr>
-        <p:style>
-          <a:lnRef idx="2">
-            <a:schemeClr val="dk1">
-              <a:shade val="50000"/>
-            </a:schemeClr>
-          </a:lnRef>
-          <a:fillRef idx="1">
-            <a:schemeClr val="dk1"/>
-          </a:fillRef>
-          <a:effectRef idx="0">
-            <a:schemeClr val="dk1"/>
-          </a:effectRef>
-          <a:fontRef idx="minor">
-            <a:schemeClr val="lt1"/>
-          </a:fontRef>
-        </p:style>
-        <p:txBody>
-          <a:bodyPr rtlCol="0" anchor="ctr"/>
-          <a:lstStyle/>
-          <a:p>
-            <a:pPr algn="ctr"/>
-            <a:endParaRPr lang="en-GB"/>
-          </a:p>
-        </p:txBody>
-      </p:sp>
-      <p:sp>
-        <p:nvSpPr>
-          <p:cNvPr id="44" name="Elipse 35"/>
-          <p:cNvSpPr/>
-          <p:nvPr/>
-        </p:nvSpPr>
-        <p:spPr>
-          <a:xfrm rot="5400000">
-            <a:off x="5498096" y="5643286"/>
             <a:ext cx="72000" cy="72000"/>
           </a:xfrm>
           <a:prstGeom prst="ellipse">

</xml_diff>